<commit_message>
Added context to the plan and slides
</commit_message>
<xml_diff>
--- a/documents/Cahier de charges Projet SE.pptx
+++ b/documents/Cahier de charges Projet SE.pptx
@@ -9,19 +9,20 @@
     <p:sldId id="257" r:id="rId3"/>
     <p:sldId id="258" r:id="rId4"/>
     <p:sldId id="259" r:id="rId5"/>
-    <p:sldId id="260" r:id="rId6"/>
-    <p:sldId id="261" r:id="rId7"/>
-    <p:sldId id="262" r:id="rId8"/>
-    <p:sldId id="263" r:id="rId9"/>
-    <p:sldId id="264" r:id="rId10"/>
-    <p:sldId id="265" r:id="rId11"/>
-    <p:sldId id="266" r:id="rId12"/>
-    <p:sldId id="267" r:id="rId13"/>
-    <p:sldId id="268" r:id="rId14"/>
-    <p:sldId id="269" r:id="rId15"/>
-    <p:sldId id="270" r:id="rId16"/>
-    <p:sldId id="271" r:id="rId17"/>
-    <p:sldId id="272" r:id="rId18"/>
+    <p:sldId id="273" r:id="rId6"/>
+    <p:sldId id="260" r:id="rId7"/>
+    <p:sldId id="261" r:id="rId8"/>
+    <p:sldId id="262" r:id="rId9"/>
+    <p:sldId id="263" r:id="rId10"/>
+    <p:sldId id="264" r:id="rId11"/>
+    <p:sldId id="265" r:id="rId12"/>
+    <p:sldId id="266" r:id="rId13"/>
+    <p:sldId id="267" r:id="rId14"/>
+    <p:sldId id="268" r:id="rId15"/>
+    <p:sldId id="269" r:id="rId16"/>
+    <p:sldId id="270" r:id="rId17"/>
+    <p:sldId id="271" r:id="rId18"/>
+    <p:sldId id="272" r:id="rId19"/>
   </p:sldIdLst>
   <p:sldSz cx="12192000" cy="6858000"/>
   <p:notesSz cx="6858000" cy="9144000"/>
@@ -275,7 +276,7 @@
           <a:p>
             <a:fld id="{81FFB37C-7F52-4E29-81F8-44FD567B7EA9}" type="datetimeFigureOut">
               <a:rPr lang="en-US" smtClean="0"/>
-              <a:t>4/19/2024</a:t>
+              <a:t>4/20/2024</a:t>
             </a:fld>
             <a:endParaRPr lang="en-US"/>
           </a:p>
@@ -473,7 +474,7 @@
           <a:p>
             <a:fld id="{81FFB37C-7F52-4E29-81F8-44FD567B7EA9}" type="datetimeFigureOut">
               <a:rPr lang="en-US" smtClean="0"/>
-              <a:t>4/19/2024</a:t>
+              <a:t>4/20/2024</a:t>
             </a:fld>
             <a:endParaRPr lang="en-US"/>
           </a:p>
@@ -681,7 +682,7 @@
           <a:p>
             <a:fld id="{81FFB37C-7F52-4E29-81F8-44FD567B7EA9}" type="datetimeFigureOut">
               <a:rPr lang="en-US" smtClean="0"/>
-              <a:t>4/19/2024</a:t>
+              <a:t>4/20/2024</a:t>
             </a:fld>
             <a:endParaRPr lang="en-US"/>
           </a:p>
@@ -879,7 +880,7 @@
           <a:p>
             <a:fld id="{81FFB37C-7F52-4E29-81F8-44FD567B7EA9}" type="datetimeFigureOut">
               <a:rPr lang="en-US" smtClean="0"/>
-              <a:t>4/19/2024</a:t>
+              <a:t>4/20/2024</a:t>
             </a:fld>
             <a:endParaRPr lang="en-US"/>
           </a:p>
@@ -1154,7 +1155,7 @@
           <a:p>
             <a:fld id="{81FFB37C-7F52-4E29-81F8-44FD567B7EA9}" type="datetimeFigureOut">
               <a:rPr lang="en-US" smtClean="0"/>
-              <a:t>4/19/2024</a:t>
+              <a:t>4/20/2024</a:t>
             </a:fld>
             <a:endParaRPr lang="en-US"/>
           </a:p>
@@ -1419,7 +1420,7 @@
           <a:p>
             <a:fld id="{81FFB37C-7F52-4E29-81F8-44FD567B7EA9}" type="datetimeFigureOut">
               <a:rPr lang="en-US" smtClean="0"/>
-              <a:t>4/19/2024</a:t>
+              <a:t>4/20/2024</a:t>
             </a:fld>
             <a:endParaRPr lang="en-US"/>
           </a:p>
@@ -1831,7 +1832,7 @@
           <a:p>
             <a:fld id="{81FFB37C-7F52-4E29-81F8-44FD567B7EA9}" type="datetimeFigureOut">
               <a:rPr lang="en-US" smtClean="0"/>
-              <a:t>4/19/2024</a:t>
+              <a:t>4/20/2024</a:t>
             </a:fld>
             <a:endParaRPr lang="en-US"/>
           </a:p>
@@ -1972,7 +1973,7 @@
           <a:p>
             <a:fld id="{81FFB37C-7F52-4E29-81F8-44FD567B7EA9}" type="datetimeFigureOut">
               <a:rPr lang="en-US" smtClean="0"/>
-              <a:t>4/19/2024</a:t>
+              <a:t>4/20/2024</a:t>
             </a:fld>
             <a:endParaRPr lang="en-US"/>
           </a:p>
@@ -2085,7 +2086,7 @@
           <a:p>
             <a:fld id="{81FFB37C-7F52-4E29-81F8-44FD567B7EA9}" type="datetimeFigureOut">
               <a:rPr lang="en-US" smtClean="0"/>
-              <a:t>4/19/2024</a:t>
+              <a:t>4/20/2024</a:t>
             </a:fld>
             <a:endParaRPr lang="en-US"/>
           </a:p>
@@ -2396,7 +2397,7 @@
           <a:p>
             <a:fld id="{81FFB37C-7F52-4E29-81F8-44FD567B7EA9}" type="datetimeFigureOut">
               <a:rPr lang="en-US" smtClean="0"/>
-              <a:t>4/19/2024</a:t>
+              <a:t>4/20/2024</a:t>
             </a:fld>
             <a:endParaRPr lang="en-US"/>
           </a:p>
@@ -2684,7 +2685,7 @@
           <a:p>
             <a:fld id="{81FFB37C-7F52-4E29-81F8-44FD567B7EA9}" type="datetimeFigureOut">
               <a:rPr lang="en-US" smtClean="0"/>
-              <a:t>4/19/2024</a:t>
+              <a:t>4/20/2024</a:t>
             </a:fld>
             <a:endParaRPr lang="en-US"/>
           </a:p>
@@ -2925,7 +2926,7 @@
           <a:p>
             <a:fld id="{81FFB37C-7F52-4E29-81F8-44FD567B7EA9}" type="datetimeFigureOut">
               <a:rPr lang="en-US" smtClean="0"/>
-              <a:t>4/19/2024</a:t>
+              <a:t>4/20/2024</a:t>
             </a:fld>
             <a:endParaRPr lang="en-US"/>
           </a:p>
@@ -3724,6 +3725,200 @@
           <a:p>
             <a:r>
               <a:rPr lang="en-US" dirty="0"/>
+              <a:t>Exigences Techniques</a:t>
+            </a:r>
+          </a:p>
+        </p:txBody>
+      </p:sp>
+      <p:sp>
+        <p:nvSpPr>
+          <p:cNvPr id="4" name="Content Placeholder 3">
+            <a:extLst>
+              <a:ext uri="{FF2B5EF4-FFF2-40B4-BE49-F238E27FC236}">
+                <a16:creationId xmlns:a16="http://schemas.microsoft.com/office/drawing/2014/main" id="{8512EFD9-3830-EF1E-1965-0C279DF4815A}"/>
+              </a:ext>
+            </a:extLst>
+          </p:cNvPr>
+          <p:cNvSpPr>
+            <a:spLocks noGrp="1"/>
+          </p:cNvSpPr>
+          <p:nvPr>
+            <p:ph idx="1"/>
+          </p:nvPr>
+        </p:nvSpPr>
+        <p:spPr/>
+        <p:txBody>
+          <a:bodyPr/>
+          <a:lstStyle/>
+          <a:p>
+            <a:r>
+              <a:rPr lang="en-US" dirty="0"/>
+              <a:t>Paquet de </a:t>
+            </a:r>
+            <a:r>
+              <a:rPr lang="en-US" dirty="0" err="1"/>
+              <a:t>l’application</a:t>
+            </a:r>
+            <a:r>
+              <a:rPr lang="en-US" dirty="0"/>
+              <a:t> doit etre accessible </a:t>
+            </a:r>
+            <a:r>
+              <a:rPr lang="en-US" dirty="0" err="1"/>
+              <a:t>depuis</a:t>
+            </a:r>
+            <a:r>
+              <a:rPr lang="en-US" dirty="0"/>
+              <a:t> un depot GitHub</a:t>
+            </a:r>
+          </a:p>
+          <a:p>
+            <a:endParaRPr lang="en-US" dirty="0"/>
+          </a:p>
+          <a:p>
+            <a:r>
+              <a:rPr lang="en-US" dirty="0" err="1"/>
+              <a:t>L’application</a:t>
+            </a:r>
+            <a:r>
+              <a:rPr lang="en-US" dirty="0"/>
+              <a:t> a 2 parties (service et interface </a:t>
+            </a:r>
+            <a:r>
+              <a:rPr lang="en-US" dirty="0" err="1"/>
+              <a:t>utilisateur</a:t>
+            </a:r>
+            <a:r>
+              <a:rPr lang="en-US" dirty="0"/>
+              <a:t>) </a:t>
+            </a:r>
+            <a:r>
+              <a:rPr lang="en-US" dirty="0" err="1"/>
+              <a:t>ecrites</a:t>
+            </a:r>
+            <a:r>
+              <a:rPr lang="en-US" dirty="0"/>
+              <a:t> </a:t>
+            </a:r>
+            <a:r>
+              <a:rPr lang="en-US" dirty="0" err="1"/>
+              <a:t>en</a:t>
+            </a:r>
+            <a:r>
+              <a:rPr lang="en-US" dirty="0"/>
+              <a:t> Python.</a:t>
+            </a:r>
+          </a:p>
+          <a:p>
+            <a:endParaRPr lang="en-US" dirty="0"/>
+          </a:p>
+          <a:p>
+            <a:r>
+              <a:rPr lang="en-US" dirty="0" err="1"/>
+              <a:t>L’application</a:t>
+            </a:r>
+            <a:r>
+              <a:rPr lang="en-US" dirty="0"/>
+              <a:t> </a:t>
+            </a:r>
+            <a:r>
+              <a:rPr lang="en-US" dirty="0" err="1"/>
+              <a:t>n’est</a:t>
+            </a:r>
+            <a:r>
+              <a:rPr lang="en-US" dirty="0"/>
+              <a:t> pas accessible </a:t>
+            </a:r>
+            <a:r>
+              <a:rPr lang="en-US" dirty="0" err="1"/>
+              <a:t>en</a:t>
+            </a:r>
+            <a:r>
+              <a:rPr lang="en-US" dirty="0"/>
+              <a:t> reseau</a:t>
+            </a:r>
+          </a:p>
+          <a:p>
+            <a:endParaRPr lang="en-US" dirty="0"/>
+          </a:p>
+          <a:p>
+            <a:r>
+              <a:rPr lang="en-US" dirty="0" err="1"/>
+              <a:t>Garder</a:t>
+            </a:r>
+            <a:r>
+              <a:rPr lang="en-US" dirty="0"/>
+              <a:t> un </a:t>
+            </a:r>
+            <a:r>
+              <a:rPr lang="en-US" dirty="0" err="1"/>
+              <a:t>historique</a:t>
+            </a:r>
+            <a:r>
+              <a:rPr lang="en-US" dirty="0"/>
+              <a:t> des actions fait sur </a:t>
+            </a:r>
+            <a:r>
+              <a:rPr lang="en-US" dirty="0" err="1"/>
+              <a:t>l’application</a:t>
+            </a:r>
+            <a:endParaRPr lang="en-US" dirty="0"/>
+          </a:p>
+        </p:txBody>
+      </p:sp>
+    </p:spTree>
+    <p:extLst>
+      <p:ext uri="{BB962C8B-B14F-4D97-AF65-F5344CB8AC3E}">
+        <p14:creationId xmlns:p14="http://schemas.microsoft.com/office/powerpoint/2010/main" val="2128480077"/>
+      </p:ext>
+    </p:extLst>
+  </p:cSld>
+  <p:clrMapOvr>
+    <a:masterClrMapping/>
+  </p:clrMapOvr>
+</p:sld>
+</file>
+
+<file path=ppt/slides/slide11.xml><?xml version="1.0" encoding="utf-8"?>
+<p:sld xmlns:a="http://schemas.openxmlformats.org/drawingml/2006/main" xmlns:r="http://schemas.openxmlformats.org/officeDocument/2006/relationships" xmlns:p="http://schemas.openxmlformats.org/presentationml/2006/main">
+  <p:cSld>
+    <p:spTree>
+      <p:nvGrpSpPr>
+        <p:cNvPr id="1" name=""/>
+        <p:cNvGrpSpPr/>
+        <p:nvPr/>
+      </p:nvGrpSpPr>
+      <p:grpSpPr>
+        <a:xfrm>
+          <a:off x="0" y="0"/>
+          <a:ext cx="0" cy="0"/>
+          <a:chOff x="0" y="0"/>
+          <a:chExt cx="0" cy="0"/>
+        </a:xfrm>
+      </p:grpSpPr>
+      <p:sp>
+        <p:nvSpPr>
+          <p:cNvPr id="2" name="Title 1">
+            <a:extLst>
+              <a:ext uri="{FF2B5EF4-FFF2-40B4-BE49-F238E27FC236}">
+                <a16:creationId xmlns:a16="http://schemas.microsoft.com/office/drawing/2014/main" id="{3BA02238-A4CF-BD59-69DF-778867D75BC1}"/>
+              </a:ext>
+            </a:extLst>
+          </p:cNvPr>
+          <p:cNvSpPr>
+            <a:spLocks noGrp="1"/>
+          </p:cNvSpPr>
+          <p:nvPr>
+            <p:ph type="title"/>
+          </p:nvPr>
+        </p:nvSpPr>
+        <p:spPr/>
+        <p:txBody>
+          <a:bodyPr/>
+          <a:lstStyle/>
+          <a:p>
+            <a:r>
+              <a:rPr lang="en-US" dirty="0"/>
               <a:t>Exigences Performances</a:t>
             </a:r>
           </a:p>
@@ -3834,7 +4029,7 @@
 </p:sld>
 </file>
 
-<file path=ppt/slides/slide11.xml><?xml version="1.0" encoding="utf-8"?>
+<file path=ppt/slides/slide12.xml><?xml version="1.0" encoding="utf-8"?>
 <p:sld xmlns:a="http://schemas.openxmlformats.org/drawingml/2006/main" xmlns:r="http://schemas.openxmlformats.org/officeDocument/2006/relationships" xmlns:p="http://schemas.openxmlformats.org/presentationml/2006/main">
   <p:cSld>
     <p:spTree>
@@ -4350,7 +4545,7 @@
 </p:sld>
 </file>
 
-<file path=ppt/slides/slide12.xml><?xml version="1.0" encoding="utf-8"?>
+<file path=ppt/slides/slide13.xml><?xml version="1.0" encoding="utf-8"?>
 <p:sld xmlns:a="http://schemas.openxmlformats.org/drawingml/2006/main" xmlns:r="http://schemas.openxmlformats.org/officeDocument/2006/relationships" xmlns:p="http://schemas.openxmlformats.org/presentationml/2006/main">
   <p:cSld>
     <p:spTree>
@@ -5225,7 +5420,7 @@
 </p:sld>
 </file>
 
-<file path=ppt/slides/slide13.xml><?xml version="1.0" encoding="utf-8"?>
+<file path=ppt/slides/slide14.xml><?xml version="1.0" encoding="utf-8"?>
 <p:sld xmlns:a="http://schemas.openxmlformats.org/drawingml/2006/main" xmlns:r="http://schemas.openxmlformats.org/officeDocument/2006/relationships" xmlns:p="http://schemas.openxmlformats.org/presentationml/2006/main">
   <p:cSld>
     <p:spTree>
@@ -6094,7 +6289,7 @@
 </p:sld>
 </file>
 
-<file path=ppt/slides/slide14.xml><?xml version="1.0" encoding="utf-8"?>
+<file path=ppt/slides/slide15.xml><?xml version="1.0" encoding="utf-8"?>
 <p:sld xmlns:a="http://schemas.openxmlformats.org/drawingml/2006/main" xmlns:r="http://schemas.openxmlformats.org/officeDocument/2006/relationships" xmlns:p="http://schemas.openxmlformats.org/presentationml/2006/main">
   <p:cSld>
     <p:spTree>
@@ -6865,7 +7060,7 @@
 </p:sld>
 </file>
 
-<file path=ppt/slides/slide15.xml><?xml version="1.0" encoding="utf-8"?>
+<file path=ppt/slides/slide16.xml><?xml version="1.0" encoding="utf-8"?>
 <p:sld xmlns:a="http://schemas.openxmlformats.org/drawingml/2006/main" xmlns:r="http://schemas.openxmlformats.org/officeDocument/2006/relationships" xmlns:p="http://schemas.openxmlformats.org/presentationml/2006/main">
   <p:cSld>
     <p:spTree>
@@ -6966,7 +7161,7 @@
 </p:sld>
 </file>
 
-<file path=ppt/slides/slide16.xml><?xml version="1.0" encoding="utf-8"?>
+<file path=ppt/slides/slide17.xml><?xml version="1.0" encoding="utf-8"?>
 <p:sld xmlns:a="http://schemas.openxmlformats.org/drawingml/2006/main" xmlns:r="http://schemas.openxmlformats.org/officeDocument/2006/relationships" xmlns:p="http://schemas.openxmlformats.org/presentationml/2006/main">
   <p:cSld>
     <p:spTree>
@@ -7325,7 +7520,7 @@
 </p:sld>
 </file>
 
-<file path=ppt/slides/slide17.xml><?xml version="1.0" encoding="utf-8"?>
+<file path=ppt/slides/slide18.xml><?xml version="1.0" encoding="utf-8"?>
 <p:sld xmlns:a="http://schemas.openxmlformats.org/drawingml/2006/main" xmlns:r="http://schemas.openxmlformats.org/officeDocument/2006/relationships" xmlns:p="http://schemas.openxmlformats.org/presentationml/2006/main">
   <p:cSld>
     <p:spTree>
@@ -7659,8 +7854,32 @@
         </p:nvSpPr>
         <p:spPr/>
         <p:txBody>
-          <a:bodyPr/>
+          <a:bodyPr>
+            <a:normAutofit fontScale="92500" lnSpcReduction="20000"/>
+          </a:bodyPr>
           <a:lstStyle/>
+          <a:p>
+            <a:r>
+              <a:rPr lang="en-US" dirty="0" err="1"/>
+              <a:t>Contexte</a:t>
+            </a:r>
+            <a:r>
+              <a:rPr lang="en-US" dirty="0"/>
+              <a:t> et justification</a:t>
+            </a:r>
+          </a:p>
+          <a:p>
+            <a:pPr marL="0" indent="0">
+              <a:buNone/>
+            </a:pPr>
+            <a:endParaRPr lang="en-US" dirty="0"/>
+          </a:p>
+          <a:p>
+            <a:pPr marL="0" indent="0">
+              <a:buNone/>
+            </a:pPr>
+            <a:endParaRPr lang="en-US" dirty="0"/>
+          </a:p>
           <a:p>
             <a:r>
               <a:rPr lang="en-US" dirty="0" err="1"/>
@@ -7672,6 +7891,9 @@
             <a:endParaRPr lang="en-US" dirty="0"/>
           </a:p>
           <a:p>
+            <a:endParaRPr lang="en-US" dirty="0"/>
+          </a:p>
+          <a:p>
             <a:r>
               <a:rPr lang="en-US" dirty="0"/>
               <a:t>Description du </a:t>
@@ -7686,6 +7908,9 @@
             <a:endParaRPr lang="en-US" dirty="0"/>
           </a:p>
           <a:p>
+            <a:endParaRPr lang="en-US" dirty="0"/>
+          </a:p>
+          <a:p>
             <a:r>
               <a:rPr lang="en-US" dirty="0"/>
               <a:t>Exigences </a:t>
@@ -7698,12 +7923,6 @@
           </a:p>
           <a:p>
             <a:endParaRPr lang="en-US" dirty="0"/>
-          </a:p>
-          <a:p>
-            <a:r>
-              <a:rPr lang="en-US" dirty="0"/>
-              <a:t>Exigences techniques</a:t>
-            </a:r>
           </a:p>
         </p:txBody>
       </p:sp>
@@ -7783,8 +8002,22 @@
         </p:nvSpPr>
         <p:spPr/>
         <p:txBody>
-          <a:bodyPr/>
+          <a:bodyPr>
+            <a:normAutofit fontScale="92500" lnSpcReduction="20000"/>
+          </a:bodyPr>
           <a:lstStyle/>
+          <a:p>
+            <a:r>
+              <a:rPr lang="en-US" dirty="0"/>
+              <a:t>Exigences techniques</a:t>
+            </a:r>
+          </a:p>
+          <a:p>
+            <a:endParaRPr lang="en-US" dirty="0"/>
+          </a:p>
+          <a:p>
+            <a:endParaRPr lang="en-US" dirty="0"/>
+          </a:p>
           <a:p>
             <a:r>
               <a:rPr lang="en-US" dirty="0" err="1"/>
@@ -7896,7 +8129,7 @@
           <a:p>
             <a:r>
               <a:rPr lang="fr-FR" dirty="0"/>
-              <a:t>Objectifs</a:t>
+              <a:t>Contexte et justification</a:t>
             </a:r>
           </a:p>
         </p:txBody>
@@ -7923,12 +8156,57 @@
           <a:lstStyle/>
           <a:p>
             <a:r>
-              <a:rPr lang="fr-FR" dirty="0"/>
-              <a:t>Développer</a:t>
-            </a:r>
-            <a:r>
               <a:rPr lang="en-US" dirty="0"/>
-              <a:t> et deployer un </a:t>
+              <a:t>Adoption des SEs Linux par dans les </a:t>
+            </a:r>
+            <a:r>
+              <a:rPr lang="en-US" dirty="0" err="1"/>
+              <a:t>entreprises</a:t>
+            </a:r>
+            <a:r>
+              <a:rPr lang="en-US" dirty="0"/>
+              <a:t> et </a:t>
+            </a:r>
+            <a:r>
+              <a:rPr lang="en-US" dirty="0" err="1"/>
+              <a:t>gouvernements</a:t>
+            </a:r>
+            <a:r>
+              <a:rPr lang="en-US" dirty="0"/>
+              <a:t>.</a:t>
+            </a:r>
+          </a:p>
+          <a:p>
+            <a:endParaRPr lang="en-US" dirty="0"/>
+          </a:p>
+          <a:p>
+            <a:endParaRPr lang="en-US" dirty="0"/>
+          </a:p>
+          <a:p>
+            <a:r>
+              <a:rPr lang="en-US" dirty="0" err="1"/>
+              <a:t>Courbe</a:t>
+            </a:r>
+            <a:r>
+              <a:rPr lang="en-US" dirty="0"/>
+              <a:t> </a:t>
+            </a:r>
+            <a:r>
+              <a:rPr lang="en-US" dirty="0" err="1"/>
+              <a:t>d’apprentissage</a:t>
+            </a:r>
+            <a:endParaRPr lang="en-US" dirty="0"/>
+          </a:p>
+          <a:p>
+            <a:endParaRPr lang="en-US" dirty="0"/>
+          </a:p>
+          <a:p>
+            <a:endParaRPr lang="en-US" dirty="0"/>
+          </a:p>
+          <a:p>
+            <a:r>
+              <a:rPr lang="en-US" dirty="0"/>
+              <a:t>Manque des applications de </a:t>
             </a:r>
             <a:r>
               <a:rPr lang="en-US" dirty="0" err="1"/>
@@ -7936,29 +8214,19 @@
             </a:r>
             <a:r>
               <a:rPr lang="en-US" dirty="0"/>
-              <a:t> de taches avec </a:t>
+              <a:t> de taches </a:t>
             </a:r>
             <a:r>
               <a:rPr lang="en-US" dirty="0" err="1"/>
-              <a:t>une</a:t>
+              <a:t>offrant</a:t>
             </a:r>
             <a:r>
               <a:rPr lang="en-US" dirty="0"/>
-              <a:t> interface </a:t>
+              <a:t> des </a:t>
             </a:r>
             <a:r>
               <a:rPr lang="en-US" dirty="0" err="1"/>
-              <a:t>graphique</a:t>
-            </a:r>
-            <a:endParaRPr lang="en-US" dirty="0"/>
-          </a:p>
-          <a:p>
-            <a:endParaRPr lang="en-US" dirty="0"/>
-          </a:p>
-          <a:p>
-            <a:r>
-              <a:rPr lang="en-US" dirty="0" err="1"/>
-              <a:t>Empaqueter</a:t>
+              <a:t>fonctionnalites</a:t>
             </a:r>
             <a:r>
               <a:rPr lang="en-US" dirty="0"/>
@@ -7966,36 +8234,17 @@
             </a:r>
             <a:r>
               <a:rPr lang="en-US" dirty="0" err="1"/>
-              <a:t>ce</a:t>
+              <a:t>tel</a:t>
             </a:r>
             <a:r>
               <a:rPr lang="en-US" dirty="0"/>
-              <a:t> </a:t>
-            </a:r>
-            <a:r>
-              <a:rPr lang="en-US" dirty="0" err="1"/>
-              <a:t>logiciel</a:t>
-            </a:r>
-            <a:r>
-              <a:rPr lang="en-US" dirty="0"/>
-              <a:t> </a:t>
-            </a:r>
-            <a:r>
-              <a:rPr lang="fr-CM" dirty="0"/>
-              <a:t>comme</a:t>
-            </a:r>
-            <a:r>
-              <a:rPr lang="en-US" dirty="0"/>
-              <a:t> un </a:t>
-            </a:r>
-            <a:r>
-              <a:rPr lang="en-US" dirty="0" err="1"/>
-              <a:t>paquet</a:t>
-            </a:r>
-            <a:r>
-              <a:rPr lang="en-US" dirty="0"/>
-              <a:t> .rpm</a:t>
-            </a:r>
+              <a:t> que Windows </a:t>
+            </a:r>
+            <a:r>
+              <a:rPr lang="en-US"/>
+              <a:t>Task Manager.</a:t>
+            </a:r>
+            <a:endParaRPr lang="en-US" dirty="0"/>
           </a:p>
         </p:txBody>
       </p:sp>
@@ -8051,6 +8300,162 @@
           <a:lstStyle/>
           <a:p>
             <a:r>
+              <a:rPr lang="fr-FR" dirty="0"/>
+              <a:t>Objectifs</a:t>
+            </a:r>
+          </a:p>
+        </p:txBody>
+      </p:sp>
+      <p:sp>
+        <p:nvSpPr>
+          <p:cNvPr id="3" name="Content Placeholder 2">
+            <a:extLst>
+              <a:ext uri="{FF2B5EF4-FFF2-40B4-BE49-F238E27FC236}">
+                <a16:creationId xmlns:a16="http://schemas.microsoft.com/office/drawing/2014/main" id="{B7430928-0540-68D3-8440-942DAAD7287C}"/>
+              </a:ext>
+            </a:extLst>
+          </p:cNvPr>
+          <p:cNvSpPr>
+            <a:spLocks noGrp="1"/>
+          </p:cNvSpPr>
+          <p:nvPr>
+            <p:ph idx="1"/>
+          </p:nvPr>
+        </p:nvSpPr>
+        <p:spPr/>
+        <p:txBody>
+          <a:bodyPr/>
+          <a:lstStyle/>
+          <a:p>
+            <a:r>
+              <a:rPr lang="fr-FR" dirty="0"/>
+              <a:t>Développer</a:t>
+            </a:r>
+            <a:r>
+              <a:rPr lang="en-US" dirty="0"/>
+              <a:t> et deployer un </a:t>
+            </a:r>
+            <a:r>
+              <a:rPr lang="en-US" dirty="0" err="1"/>
+              <a:t>gestionnaire</a:t>
+            </a:r>
+            <a:r>
+              <a:rPr lang="en-US" dirty="0"/>
+              <a:t> de taches avec </a:t>
+            </a:r>
+            <a:r>
+              <a:rPr lang="en-US" dirty="0" err="1"/>
+              <a:t>une</a:t>
+            </a:r>
+            <a:r>
+              <a:rPr lang="en-US" dirty="0"/>
+              <a:t> interface </a:t>
+            </a:r>
+            <a:r>
+              <a:rPr lang="en-US" dirty="0" err="1"/>
+              <a:t>graphique</a:t>
+            </a:r>
+            <a:endParaRPr lang="en-US" dirty="0"/>
+          </a:p>
+          <a:p>
+            <a:endParaRPr lang="en-US" dirty="0"/>
+          </a:p>
+          <a:p>
+            <a:r>
+              <a:rPr lang="en-US" dirty="0" err="1"/>
+              <a:t>Empaqueter</a:t>
+            </a:r>
+            <a:r>
+              <a:rPr lang="en-US" dirty="0"/>
+              <a:t> </a:t>
+            </a:r>
+            <a:r>
+              <a:rPr lang="en-US" dirty="0" err="1"/>
+              <a:t>ce</a:t>
+            </a:r>
+            <a:r>
+              <a:rPr lang="en-US" dirty="0"/>
+              <a:t> </a:t>
+            </a:r>
+            <a:r>
+              <a:rPr lang="en-US" dirty="0" err="1"/>
+              <a:t>logiciel</a:t>
+            </a:r>
+            <a:r>
+              <a:rPr lang="en-US" dirty="0"/>
+              <a:t> </a:t>
+            </a:r>
+            <a:r>
+              <a:rPr lang="fr-CM" dirty="0"/>
+              <a:t>comme</a:t>
+            </a:r>
+            <a:r>
+              <a:rPr lang="en-US" dirty="0"/>
+              <a:t> un </a:t>
+            </a:r>
+            <a:r>
+              <a:rPr lang="en-US" dirty="0" err="1"/>
+              <a:t>paquet</a:t>
+            </a:r>
+            <a:r>
+              <a:rPr lang="en-US" dirty="0"/>
+              <a:t> .rpm</a:t>
+            </a:r>
+          </a:p>
+        </p:txBody>
+      </p:sp>
+    </p:spTree>
+    <p:extLst>
+      <p:ext uri="{BB962C8B-B14F-4D97-AF65-F5344CB8AC3E}">
+        <p14:creationId xmlns:p14="http://schemas.microsoft.com/office/powerpoint/2010/main" val="39130101"/>
+      </p:ext>
+    </p:extLst>
+  </p:cSld>
+  <p:clrMapOvr>
+    <a:masterClrMapping/>
+  </p:clrMapOvr>
+</p:sld>
+</file>
+
+<file path=ppt/slides/slide6.xml><?xml version="1.0" encoding="utf-8"?>
+<p:sld xmlns:a="http://schemas.openxmlformats.org/drawingml/2006/main" xmlns:r="http://schemas.openxmlformats.org/officeDocument/2006/relationships" xmlns:p="http://schemas.openxmlformats.org/presentationml/2006/main">
+  <p:cSld>
+    <p:spTree>
+      <p:nvGrpSpPr>
+        <p:cNvPr id="1" name=""/>
+        <p:cNvGrpSpPr/>
+        <p:nvPr/>
+      </p:nvGrpSpPr>
+      <p:grpSpPr>
+        <a:xfrm>
+          <a:off x="0" y="0"/>
+          <a:ext cx="0" cy="0"/>
+          <a:chOff x="0" y="0"/>
+          <a:chExt cx="0" cy="0"/>
+        </a:xfrm>
+      </p:grpSpPr>
+      <p:sp>
+        <p:nvSpPr>
+          <p:cNvPr id="2" name="Title 1">
+            <a:extLst>
+              <a:ext uri="{FF2B5EF4-FFF2-40B4-BE49-F238E27FC236}">
+                <a16:creationId xmlns:a16="http://schemas.microsoft.com/office/drawing/2014/main" id="{3BA02238-A4CF-BD59-69DF-778867D75BC1}"/>
+              </a:ext>
+            </a:extLst>
+          </p:cNvPr>
+          <p:cNvSpPr>
+            <a:spLocks noGrp="1"/>
+          </p:cNvSpPr>
+          <p:nvPr>
+            <p:ph type="title"/>
+          </p:nvPr>
+        </p:nvSpPr>
+        <p:spPr/>
+        <p:txBody>
+          <a:bodyPr/>
+          <a:lstStyle/>
+          <a:p>
+            <a:r>
               <a:rPr lang="en-US" dirty="0"/>
               <a:t>Description du </a:t>
             </a:r>
@@ -8193,7 +8598,7 @@
 </p:sld>
 </file>
 
-<file path=ppt/slides/slide6.xml><?xml version="1.0" encoding="utf-8"?>
+<file path=ppt/slides/slide7.xml><?xml version="1.0" encoding="utf-8"?>
 <p:sld xmlns:a="http://schemas.openxmlformats.org/drawingml/2006/main" xmlns:r="http://schemas.openxmlformats.org/officeDocument/2006/relationships" xmlns:p="http://schemas.openxmlformats.org/presentationml/2006/main">
   <p:cSld>
     <p:spTree>
@@ -8288,7 +8693,7 @@
 </p:sld>
 </file>
 
-<file path=ppt/slides/slide7.xml><?xml version="1.0" encoding="utf-8"?>
+<file path=ppt/slides/slide8.xml><?xml version="1.0" encoding="utf-8"?>
 <p:sld xmlns:a="http://schemas.openxmlformats.org/drawingml/2006/main" xmlns:r="http://schemas.openxmlformats.org/officeDocument/2006/relationships" xmlns:p="http://schemas.openxmlformats.org/presentationml/2006/main">
   <p:cSld>
     <p:spTree>
@@ -8383,241 +8788,6 @@
 </p:sld>
 </file>
 
-<file path=ppt/slides/slide8.xml><?xml version="1.0" encoding="utf-8"?>
-<p:sld xmlns:a="http://schemas.openxmlformats.org/drawingml/2006/main" xmlns:r="http://schemas.openxmlformats.org/officeDocument/2006/relationships" xmlns:p="http://schemas.openxmlformats.org/presentationml/2006/main">
-  <p:cSld>
-    <p:spTree>
-      <p:nvGrpSpPr>
-        <p:cNvPr id="1" name=""/>
-        <p:cNvGrpSpPr/>
-        <p:nvPr/>
-      </p:nvGrpSpPr>
-      <p:grpSpPr>
-        <a:xfrm>
-          <a:off x="0" y="0"/>
-          <a:ext cx="0" cy="0"/>
-          <a:chOff x="0" y="0"/>
-          <a:chExt cx="0" cy="0"/>
-        </a:xfrm>
-      </p:grpSpPr>
-      <p:sp>
-        <p:nvSpPr>
-          <p:cNvPr id="2" name="Title 1">
-            <a:extLst>
-              <a:ext uri="{FF2B5EF4-FFF2-40B4-BE49-F238E27FC236}">
-                <a16:creationId xmlns:a16="http://schemas.microsoft.com/office/drawing/2014/main" id="{3BA02238-A4CF-BD59-69DF-778867D75BC1}"/>
-              </a:ext>
-            </a:extLst>
-          </p:cNvPr>
-          <p:cNvSpPr>
-            <a:spLocks noGrp="1"/>
-          </p:cNvSpPr>
-          <p:nvPr>
-            <p:ph type="title"/>
-          </p:nvPr>
-        </p:nvSpPr>
-        <p:spPr/>
-        <p:txBody>
-          <a:bodyPr/>
-          <a:lstStyle/>
-          <a:p>
-            <a:r>
-              <a:rPr lang="en-US" dirty="0"/>
-              <a:t>Exigences </a:t>
-            </a:r>
-            <a:r>
-              <a:rPr lang="en-US" dirty="0" err="1"/>
-              <a:t>Fonctionnelles</a:t>
-            </a:r>
-            <a:endParaRPr lang="en-US" dirty="0"/>
-          </a:p>
-        </p:txBody>
-      </p:sp>
-      <p:sp>
-        <p:nvSpPr>
-          <p:cNvPr id="4" name="Content Placeholder 3">
-            <a:extLst>
-              <a:ext uri="{FF2B5EF4-FFF2-40B4-BE49-F238E27FC236}">
-                <a16:creationId xmlns:a16="http://schemas.microsoft.com/office/drawing/2014/main" id="{8512EFD9-3830-EF1E-1965-0C279DF4815A}"/>
-              </a:ext>
-            </a:extLst>
-          </p:cNvPr>
-          <p:cNvSpPr>
-            <a:spLocks noGrp="1"/>
-          </p:cNvSpPr>
-          <p:nvPr>
-            <p:ph idx="1"/>
-          </p:nvPr>
-        </p:nvSpPr>
-        <p:spPr/>
-        <p:txBody>
-          <a:bodyPr/>
-          <a:lstStyle/>
-          <a:p>
-            <a:r>
-              <a:rPr lang="en-US" dirty="0"/>
-              <a:t>Accessible </a:t>
-            </a:r>
-            <a:r>
-              <a:rPr lang="en-US" dirty="0" err="1"/>
-              <a:t>depuis</a:t>
-            </a:r>
-            <a:r>
-              <a:rPr lang="en-US" dirty="0"/>
-              <a:t> </a:t>
-            </a:r>
-            <a:r>
-              <a:rPr lang="en-US" dirty="0" err="1"/>
-              <a:t>l’invite</a:t>
-            </a:r>
-            <a:r>
-              <a:rPr lang="en-US" dirty="0"/>
-              <a:t> de </a:t>
-            </a:r>
-            <a:r>
-              <a:rPr lang="en-US" dirty="0" err="1"/>
-              <a:t>commande</a:t>
-            </a:r>
-            <a:r>
-              <a:rPr lang="en-US" dirty="0"/>
-              <a:t>. Est capable de</a:t>
-            </a:r>
-          </a:p>
-          <a:p>
-            <a:pPr lvl="1"/>
-            <a:r>
-              <a:rPr lang="en-US" dirty="0"/>
-              <a:t>Lister et </a:t>
-            </a:r>
-            <a:r>
-              <a:rPr lang="en-US" dirty="0" err="1"/>
-              <a:t>arreter</a:t>
-            </a:r>
-            <a:r>
-              <a:rPr lang="en-US" dirty="0"/>
-              <a:t> les processus </a:t>
-            </a:r>
-            <a:r>
-              <a:rPr lang="en-US" dirty="0" err="1"/>
-              <a:t>en</a:t>
-            </a:r>
-            <a:r>
-              <a:rPr lang="en-US" dirty="0"/>
-              <a:t> cours </a:t>
-            </a:r>
-            <a:r>
-              <a:rPr lang="en-US" dirty="0" err="1"/>
-              <a:t>d’execution</a:t>
-            </a:r>
-            <a:endParaRPr lang="en-US" dirty="0"/>
-          </a:p>
-          <a:p>
-            <a:pPr lvl="1"/>
-            <a:r>
-              <a:rPr lang="en-US" dirty="0" err="1"/>
-              <a:t>Arreter</a:t>
-            </a:r>
-            <a:r>
-              <a:rPr lang="en-US" dirty="0"/>
-              <a:t> les processus</a:t>
-            </a:r>
-          </a:p>
-          <a:p>
-            <a:pPr lvl="1"/>
-            <a:r>
-              <a:rPr lang="en-US" dirty="0" err="1"/>
-              <a:t>Arreter</a:t>
-            </a:r>
-            <a:r>
-              <a:rPr lang="en-US" dirty="0"/>
-              <a:t>, </a:t>
-            </a:r>
-            <a:r>
-              <a:rPr lang="en-US" dirty="0" err="1"/>
-              <a:t>demarrer</a:t>
-            </a:r>
-            <a:r>
-              <a:rPr lang="en-US" dirty="0"/>
-              <a:t> et </a:t>
-            </a:r>
-            <a:r>
-              <a:rPr lang="en-US" dirty="0" err="1"/>
-              <a:t>redemarrer</a:t>
-            </a:r>
-            <a:r>
-              <a:rPr lang="en-US" dirty="0"/>
-              <a:t> les services</a:t>
-            </a:r>
-          </a:p>
-          <a:p>
-            <a:pPr lvl="1"/>
-            <a:endParaRPr lang="en-US" dirty="0"/>
-          </a:p>
-          <a:p>
-            <a:r>
-              <a:rPr lang="en-US" dirty="0" err="1"/>
-              <a:t>L’interface</a:t>
-            </a:r>
-            <a:r>
-              <a:rPr lang="en-US" dirty="0"/>
-              <a:t> </a:t>
-            </a:r>
-            <a:r>
-              <a:rPr lang="en-US" dirty="0" err="1"/>
-              <a:t>graphique</a:t>
-            </a:r>
-            <a:r>
-              <a:rPr lang="en-US" dirty="0"/>
-              <a:t> </a:t>
-            </a:r>
-            <a:r>
-              <a:rPr lang="en-US" dirty="0" err="1"/>
-              <a:t>est</a:t>
-            </a:r>
-            <a:r>
-              <a:rPr lang="en-US" dirty="0"/>
-              <a:t> accessible </a:t>
-            </a:r>
-            <a:r>
-              <a:rPr lang="en-US" dirty="0" err="1"/>
-              <a:t>en</a:t>
-            </a:r>
-            <a:r>
-              <a:rPr lang="en-US" dirty="0"/>
-              <a:t> </a:t>
-            </a:r>
-            <a:r>
-              <a:rPr lang="en-US" dirty="0" err="1"/>
-              <a:t>utilisant</a:t>
-            </a:r>
-            <a:r>
-              <a:rPr lang="en-US" dirty="0"/>
-              <a:t> un </a:t>
-            </a:r>
-            <a:r>
-              <a:rPr lang="en-US" dirty="0" err="1"/>
-              <a:t>raccourci</a:t>
-            </a:r>
-            <a:r>
-              <a:rPr lang="en-US" dirty="0"/>
-              <a:t> clavier.</a:t>
-            </a:r>
-          </a:p>
-        </p:txBody>
-      </p:sp>
-    </p:spTree>
-    <p:extLst>
-      <p:ext uri="{BB962C8B-B14F-4D97-AF65-F5344CB8AC3E}">
-        <p14:creationId xmlns:p14="http://schemas.microsoft.com/office/powerpoint/2010/main" val="2922120948"/>
-      </p:ext>
-    </p:extLst>
-  </p:cSld>
-  <p:clrMapOvr>
-    <a:masterClrMapping/>
-  </p:clrMapOvr>
-</p:sld>
-</file>
-
 <file path=ppt/slides/slide9.xml><?xml version="1.0" encoding="utf-8"?>
 <p:sld xmlns:a="http://schemas.openxmlformats.org/drawingml/2006/main" xmlns:r="http://schemas.openxmlformats.org/officeDocument/2006/relationships" xmlns:p="http://schemas.openxmlformats.org/presentationml/2006/main">
   <p:cSld>
@@ -8658,8 +8828,13 @@
           <a:p>
             <a:r>
               <a:rPr lang="en-US" dirty="0"/>
-              <a:t>Exigences Techniques</a:t>
-            </a:r>
+              <a:t>Exigences </a:t>
+            </a:r>
+            <a:r>
+              <a:rPr lang="en-US" dirty="0" err="1"/>
+              <a:t>Fonctionnelles</a:t>
+            </a:r>
+            <a:endParaRPr lang="en-US" dirty="0"/>
           </a:p>
         </p:txBody>
       </p:sp>
@@ -8686,15 +8861,7 @@
           <a:p>
             <a:r>
               <a:rPr lang="en-US" dirty="0"/>
-              <a:t>Paquet de </a:t>
-            </a:r>
-            <a:r>
-              <a:rPr lang="en-US" dirty="0" err="1"/>
-              <a:t>l’application</a:t>
-            </a:r>
-            <a:r>
-              <a:rPr lang="en-US" dirty="0"/>
-              <a:t> doit etre accessible </a:t>
+              <a:t>Accessible </a:t>
             </a:r>
             <a:r>
               <a:rPr lang="en-US" dirty="0" err="1"/>
@@ -8702,32 +8869,99 @@
             </a:r>
             <a:r>
               <a:rPr lang="en-US" dirty="0"/>
-              <a:t> un depot GitHub</a:t>
-            </a:r>
-          </a:p>
-          <a:p>
+              <a:t> </a:t>
+            </a:r>
+            <a:r>
+              <a:rPr lang="en-US" dirty="0" err="1"/>
+              <a:t>l’invite</a:t>
+            </a:r>
+            <a:r>
+              <a:rPr lang="en-US" dirty="0"/>
+              <a:t> de </a:t>
+            </a:r>
+            <a:r>
+              <a:rPr lang="en-US" dirty="0" err="1"/>
+              <a:t>commande</a:t>
+            </a:r>
+            <a:r>
+              <a:rPr lang="en-US" dirty="0"/>
+              <a:t>. Est capable de</a:t>
+            </a:r>
+          </a:p>
+          <a:p>
+            <a:pPr lvl="1"/>
+            <a:r>
+              <a:rPr lang="en-US" dirty="0"/>
+              <a:t>Lister et </a:t>
+            </a:r>
+            <a:r>
+              <a:rPr lang="en-US" dirty="0" err="1"/>
+              <a:t>arreter</a:t>
+            </a:r>
+            <a:r>
+              <a:rPr lang="en-US" dirty="0"/>
+              <a:t> les processus </a:t>
+            </a:r>
+            <a:r>
+              <a:rPr lang="en-US" dirty="0" err="1"/>
+              <a:t>en</a:t>
+            </a:r>
+            <a:r>
+              <a:rPr lang="en-US" dirty="0"/>
+              <a:t> cours </a:t>
+            </a:r>
+            <a:r>
+              <a:rPr lang="en-US" dirty="0" err="1"/>
+              <a:t>d’execution</a:t>
+            </a:r>
             <a:endParaRPr lang="en-US" dirty="0"/>
           </a:p>
           <a:p>
+            <a:pPr lvl="1"/>
             <a:r>
               <a:rPr lang="en-US" dirty="0" err="1"/>
-              <a:t>L’application</a:t>
+              <a:t>Arreter</a:t>
             </a:r>
             <a:r>
               <a:rPr lang="en-US" dirty="0"/>
-              <a:t> a 2 parties (service et interface </a:t>
-            </a:r>
+              <a:t> les processus</a:t>
+            </a:r>
+          </a:p>
+          <a:p>
+            <a:pPr lvl="1"/>
             <a:r>
               <a:rPr lang="en-US" dirty="0" err="1"/>
-              <a:t>utilisateur</a:t>
+              <a:t>Arreter</a:t>
             </a:r>
             <a:r>
               <a:rPr lang="en-US" dirty="0"/>
-              <a:t>) </a:t>
+              <a:t>, </a:t>
             </a:r>
             <a:r>
               <a:rPr lang="en-US" dirty="0" err="1"/>
-              <a:t>ecrites</a:t>
+              <a:t>demarrer</a:t>
+            </a:r>
+            <a:r>
+              <a:rPr lang="en-US" dirty="0"/>
+              <a:t> et </a:t>
+            </a:r>
+            <a:r>
+              <a:rPr lang="en-US" dirty="0" err="1"/>
+              <a:t>redemarrer</a:t>
+            </a:r>
+            <a:r>
+              <a:rPr lang="en-US" dirty="0"/>
+              <a:t> les services</a:t>
+            </a:r>
+          </a:p>
+          <a:p>
+            <a:pPr lvl="1"/>
+            <a:endParaRPr lang="en-US" dirty="0"/>
+          </a:p>
+          <a:p>
+            <a:r>
+              <a:rPr lang="en-US" dirty="0" err="1"/>
+              <a:t>L’interface</a:t>
             </a:r>
             <a:r>
               <a:rPr lang="en-US" dirty="0"/>
@@ -8735,20 +8969,7 @@
             </a:r>
             <a:r>
               <a:rPr lang="en-US" dirty="0" err="1"/>
-              <a:t>en</a:t>
-            </a:r>
-            <a:r>
-              <a:rPr lang="en-US" dirty="0"/>
-              <a:t> Python.</a:t>
-            </a:r>
-          </a:p>
-          <a:p>
-            <a:endParaRPr lang="en-US" dirty="0"/>
-          </a:p>
-          <a:p>
-            <a:r>
-              <a:rPr lang="en-US" dirty="0" err="1"/>
-              <a:t>L’application</a:t>
+              <a:t>graphique</a:t>
             </a:r>
             <a:r>
               <a:rPr lang="en-US" dirty="0"/>
@@ -8756,11 +8977,11 @@
             </a:r>
             <a:r>
               <a:rPr lang="en-US" dirty="0" err="1"/>
-              <a:t>n’est</a:t>
+              <a:t>est</a:t>
             </a:r>
             <a:r>
               <a:rPr lang="en-US" dirty="0"/>
-              <a:t> pas accessible </a:t>
+              <a:t> accessible </a:t>
             </a:r>
             <a:r>
               <a:rPr lang="en-US" dirty="0" err="1"/>
@@ -8768,16 +8989,11 @@
             </a:r>
             <a:r>
               <a:rPr lang="en-US" dirty="0"/>
-              <a:t> reseau</a:t>
-            </a:r>
-          </a:p>
-          <a:p>
-            <a:endParaRPr lang="en-US" dirty="0"/>
-          </a:p>
-          <a:p>
+              <a:t> </a:t>
+            </a:r>
             <a:r>
               <a:rPr lang="en-US" dirty="0" err="1"/>
-              <a:t>Garder</a:t>
+              <a:t>utilisant</a:t>
             </a:r>
             <a:r>
               <a:rPr lang="en-US" dirty="0"/>
@@ -8785,24 +9001,19 @@
             </a:r>
             <a:r>
               <a:rPr lang="en-US" dirty="0" err="1"/>
-              <a:t>historique</a:t>
+              <a:t>raccourci</a:t>
             </a:r>
             <a:r>
               <a:rPr lang="en-US" dirty="0"/>
-              <a:t> des actions fait sur </a:t>
-            </a:r>
-            <a:r>
-              <a:rPr lang="en-US" dirty="0" err="1"/>
-              <a:t>l’application</a:t>
-            </a:r>
-            <a:endParaRPr lang="en-US" dirty="0"/>
+              <a:t> clavier.</a:t>
+            </a:r>
           </a:p>
         </p:txBody>
       </p:sp>
     </p:spTree>
     <p:extLst>
       <p:ext uri="{BB962C8B-B14F-4D97-AF65-F5344CB8AC3E}">
-        <p14:creationId xmlns:p14="http://schemas.microsoft.com/office/powerpoint/2010/main" val="2128480077"/>
+        <p14:creationId xmlns:p14="http://schemas.microsoft.com/office/powerpoint/2010/main" val="2922120948"/>
       </p:ext>
     </p:extLst>
   </p:cSld>

</xml_diff>